<commit_message>
slightly updated presentation, commit after uploading again
</commit_message>
<xml_diff>
--- a/OLS-graduation/Sudhi_OLS.pptx
+++ b/OLS-graduation/Sudhi_OLS.pptx
@@ -6693,8 +6693,8 @@
         </p:nvSpPr>
         <p:spPr>
           <a:xfrm>
-            <a:off x="4134000" y="670250"/>
-            <a:ext cx="4319400" cy="1791300"/>
+            <a:off x="4134000" y="347400"/>
+            <a:ext cx="4347900" cy="2328600"/>
           </a:xfrm>
           <a:prstGeom prst="rect">
             <a:avLst/>
@@ -6757,7 +6757,7 @@
                 <a:cs typeface="Verdana"/>
                 <a:sym typeface="Verdana"/>
               </a:rPr>
-              <a:t>of Real World Problems Using DRI</a:t>
+              <a:t>of Real World Problems Using Digital Research Infrastructure</a:t>
             </a:r>
             <a:r>
               <a:rPr b="1" lang="en-GB" sz="2400">
@@ -9782,12 +9782,37 @@
               <a:buNone/>
             </a:pPr>
             <a:r>
-              <a:t/>
+              <a:rPr b="1" lang="en-GB">
+                <a:solidFill>
+                  <a:srgbClr val="274E13"/>
+                </a:solidFill>
+                <a:latin typeface="Comic Sans MS"/>
+                <a:ea typeface="Comic Sans MS"/>
+                <a:cs typeface="Comic Sans MS"/>
+                <a:sym typeface="Comic Sans MS"/>
+              </a:rPr>
+              <a:t>Connect with me</a:t>
             </a:r>
-            <a:endParaRPr>
+            <a:r>
+              <a:rPr b="1" lang="en-GB">
+                <a:solidFill>
+                  <a:srgbClr val="274E13"/>
+                </a:solidFill>
+                <a:latin typeface="Comic Sans MS"/>
+                <a:ea typeface="Comic Sans MS"/>
+                <a:cs typeface="Comic Sans MS"/>
+                <a:sym typeface="Comic Sans MS"/>
+              </a:rPr>
+              <a:t> : sudhisharmapadillath@gmail.com</a:t>
+            </a:r>
+            <a:endParaRPr b="1">
               <a:solidFill>
                 <a:srgbClr val="274E13"/>
               </a:solidFill>
+              <a:latin typeface="Comic Sans MS"/>
+              <a:ea typeface="Comic Sans MS"/>
+              <a:cs typeface="Comic Sans MS"/>
+              <a:sym typeface="Comic Sans MS"/>
             </a:endParaRPr>
           </a:p>
         </p:txBody>

</xml_diff>